<commit_message>
pdf version of poster
</commit_message>
<xml_diff>
--- a/poster.pptx
+++ b/poster.pptx
@@ -1832,7 +1832,7 @@
           <a:p>
             <a:fld id="{985D6BDF-9D0E-4E2B-85B8-D8F4790360C9}" type="datetimeFigureOut">
               <a:rPr lang="en-US" smtClean="0"/>
-              <a:t>15-Dec-19</a:t>
+              <a:t>12/16/2019</a:t>
             </a:fld>
             <a:endParaRPr lang="en-US"/>
           </a:p>
@@ -2052,7 +2052,7 @@
           <a:p>
             <a:fld id="{985D6BDF-9D0E-4E2B-85B8-D8F4790360C9}" type="datetimeFigureOut">
               <a:rPr lang="en-US" smtClean="0"/>
-              <a:t>15-Dec-19</a:t>
+              <a:t>12/16/2019</a:t>
             </a:fld>
             <a:endParaRPr lang="en-US"/>
           </a:p>
@@ -4362,349 +4362,349 @@
           <a:p>
             <a:pPr algn="just" eaLnBrk="1" hangingPunct="1"/>
             <a:r>
-              <a:rPr lang="et-EE" sz="4000" err="1" smtClean="0">
+              <a:rPr lang="et-EE" sz="4000" dirty="0" err="1" smtClean="0">
                 <a:latin typeface="+mn-lt"/>
               </a:rPr>
               <a:t>Since</a:t>
             </a:r>
             <a:r>
-              <a:rPr lang="et-EE" sz="4000" smtClean="0">
-                <a:latin typeface="+mn-lt"/>
-              </a:rPr>
-              <a:t> </a:t>
-            </a:r>
-            <a:r>
-              <a:rPr lang="et-EE" sz="4000" err="1" smtClean="0">
+              <a:rPr lang="et-EE" sz="4000" dirty="0" smtClean="0">
+                <a:latin typeface="+mn-lt"/>
+              </a:rPr>
+              <a:t> </a:t>
+            </a:r>
+            <a:r>
+              <a:rPr lang="et-EE" sz="4000" dirty="0" err="1" smtClean="0">
                 <a:latin typeface="+mn-lt"/>
               </a:rPr>
               <a:t>the</a:t>
             </a:r>
             <a:r>
-              <a:rPr lang="et-EE" sz="4000" smtClean="0">
-                <a:latin typeface="+mn-lt"/>
-              </a:rPr>
-              <a:t> </a:t>
-            </a:r>
-            <a:r>
-              <a:rPr lang="et-EE" sz="4000" err="1" smtClean="0">
+              <a:rPr lang="et-EE" sz="4000" dirty="0" smtClean="0">
+                <a:latin typeface="+mn-lt"/>
+              </a:rPr>
+              <a:t> </a:t>
+            </a:r>
+            <a:r>
+              <a:rPr lang="et-EE" sz="4000" dirty="0" err="1" smtClean="0">
                 <a:latin typeface="+mn-lt"/>
               </a:rPr>
               <a:t>datasets</a:t>
             </a:r>
             <a:r>
-              <a:rPr lang="et-EE" sz="4000" smtClean="0">
-                <a:latin typeface="+mn-lt"/>
-              </a:rPr>
-              <a:t> </a:t>
-            </a:r>
-            <a:r>
-              <a:rPr lang="et-EE" sz="4000" err="1" smtClean="0">
+              <a:rPr lang="et-EE" sz="4000" dirty="0" smtClean="0">
+                <a:latin typeface="+mn-lt"/>
+              </a:rPr>
+              <a:t> </a:t>
+            </a:r>
+            <a:r>
+              <a:rPr lang="et-EE" sz="4000" dirty="0" err="1" smtClean="0">
                 <a:latin typeface="+mn-lt"/>
               </a:rPr>
               <a:t>didn’t</a:t>
             </a:r>
             <a:r>
-              <a:rPr lang="et-EE" sz="4000" smtClean="0">
-                <a:latin typeface="+mn-lt"/>
-              </a:rPr>
-              <a:t> </a:t>
-            </a:r>
-            <a:r>
-              <a:rPr lang="et-EE" sz="4000" err="1" smtClean="0">
+              <a:rPr lang="et-EE" sz="4000" dirty="0" smtClean="0">
+                <a:latin typeface="+mn-lt"/>
+              </a:rPr>
+              <a:t> </a:t>
+            </a:r>
+            <a:r>
+              <a:rPr lang="et-EE" sz="4000" dirty="0" err="1" smtClean="0">
                 <a:latin typeface="+mn-lt"/>
               </a:rPr>
               <a:t>have</a:t>
             </a:r>
             <a:r>
-              <a:rPr lang="et-EE" sz="4000" smtClean="0">
-                <a:latin typeface="+mn-lt"/>
-              </a:rPr>
-              <a:t> </a:t>
-            </a:r>
-            <a:r>
-              <a:rPr lang="et-EE" sz="4000" err="1" smtClean="0">
+              <a:rPr lang="et-EE" sz="4000" dirty="0" smtClean="0">
+                <a:latin typeface="+mn-lt"/>
+              </a:rPr>
+              <a:t> </a:t>
+            </a:r>
+            <a:r>
+              <a:rPr lang="et-EE" sz="4000" dirty="0" err="1" smtClean="0">
                 <a:latin typeface="+mn-lt"/>
               </a:rPr>
               <a:t>any</a:t>
             </a:r>
             <a:r>
-              <a:rPr lang="et-EE" sz="4000" smtClean="0">
+              <a:rPr lang="et-EE" sz="4000" dirty="0" smtClean="0">
                 <a:latin typeface="+mn-lt"/>
               </a:rPr>
               <a:t> null </a:t>
             </a:r>
             <a:r>
-              <a:rPr lang="et-EE" sz="4000" err="1" smtClean="0">
+              <a:rPr lang="et-EE" sz="4000" dirty="0" err="1" smtClean="0">
                 <a:latin typeface="+mn-lt"/>
               </a:rPr>
               <a:t>values</a:t>
             </a:r>
             <a:r>
-              <a:rPr lang="et-EE" sz="4000" smtClean="0">
+              <a:rPr lang="et-EE" sz="4000" dirty="0" smtClean="0">
                 <a:latin typeface="+mn-lt"/>
               </a:rPr>
               <a:t>, </a:t>
             </a:r>
             <a:r>
-              <a:rPr lang="et-EE" sz="4000" err="1" smtClean="0">
+              <a:rPr lang="et-EE" sz="4000" dirty="0" err="1" smtClean="0">
                 <a:latin typeface="+mn-lt"/>
               </a:rPr>
               <a:t>we</a:t>
             </a:r>
             <a:r>
-              <a:rPr lang="et-EE" sz="4000" smtClean="0">
-                <a:latin typeface="+mn-lt"/>
-              </a:rPr>
-              <a:t> </a:t>
-            </a:r>
-            <a:r>
-              <a:rPr lang="et-EE" sz="4000" err="1" smtClean="0">
+              <a:rPr lang="et-EE" sz="4000" dirty="0" smtClean="0">
+                <a:latin typeface="+mn-lt"/>
+              </a:rPr>
+              <a:t> </a:t>
+            </a:r>
+            <a:r>
+              <a:rPr lang="et-EE" sz="4000" dirty="0" err="1" smtClean="0">
                 <a:latin typeface="+mn-lt"/>
               </a:rPr>
               <a:t>didn’t</a:t>
             </a:r>
             <a:r>
-              <a:rPr lang="et-EE" sz="4000" smtClean="0">
-                <a:latin typeface="+mn-lt"/>
-              </a:rPr>
-              <a:t> </a:t>
-            </a:r>
-            <a:r>
-              <a:rPr lang="et-EE" sz="4000" err="1" smtClean="0">
+              <a:rPr lang="et-EE" sz="4000" dirty="0" smtClean="0">
+                <a:latin typeface="+mn-lt"/>
+              </a:rPr>
+              <a:t> </a:t>
+            </a:r>
+            <a:r>
+              <a:rPr lang="et-EE" sz="4000" dirty="0" err="1" smtClean="0">
                 <a:latin typeface="+mn-lt"/>
               </a:rPr>
               <a:t>have</a:t>
             </a:r>
             <a:r>
-              <a:rPr lang="et-EE" sz="4000" smtClean="0">
-                <a:latin typeface="+mn-lt"/>
-              </a:rPr>
-              <a:t> </a:t>
-            </a:r>
-            <a:r>
-              <a:rPr lang="et-EE" sz="4000" err="1" smtClean="0">
+              <a:rPr lang="et-EE" sz="4000" dirty="0" smtClean="0">
+                <a:latin typeface="+mn-lt"/>
+              </a:rPr>
+              <a:t> </a:t>
+            </a:r>
+            <a:r>
+              <a:rPr lang="et-EE" sz="4000" dirty="0" err="1" smtClean="0">
                 <a:latin typeface="+mn-lt"/>
               </a:rPr>
               <a:t>to</a:t>
             </a:r>
             <a:r>
-              <a:rPr lang="et-EE" sz="4000" smtClean="0">
-                <a:latin typeface="+mn-lt"/>
-              </a:rPr>
-              <a:t> </a:t>
-            </a:r>
-            <a:r>
-              <a:rPr lang="et-EE" sz="4000" err="1" smtClean="0">
+              <a:rPr lang="et-EE" sz="4000" dirty="0" smtClean="0">
+                <a:latin typeface="+mn-lt"/>
+              </a:rPr>
+              <a:t> </a:t>
+            </a:r>
+            <a:r>
+              <a:rPr lang="et-EE" sz="4000" dirty="0" err="1" smtClean="0">
                 <a:latin typeface="+mn-lt"/>
               </a:rPr>
               <a:t>worry</a:t>
             </a:r>
             <a:r>
-              <a:rPr lang="et-EE" sz="4000" smtClean="0">
-                <a:latin typeface="+mn-lt"/>
-              </a:rPr>
-              <a:t> </a:t>
-            </a:r>
-            <a:r>
-              <a:rPr lang="et-EE" sz="4000" err="1" smtClean="0">
+              <a:rPr lang="et-EE" sz="4000" dirty="0" smtClean="0">
+                <a:latin typeface="+mn-lt"/>
+              </a:rPr>
+              <a:t> </a:t>
+            </a:r>
+            <a:r>
+              <a:rPr lang="et-EE" sz="4000" dirty="0" err="1" smtClean="0">
                 <a:latin typeface="+mn-lt"/>
               </a:rPr>
               <a:t>about</a:t>
             </a:r>
             <a:r>
-              <a:rPr lang="et-EE" sz="4000" smtClean="0">
-                <a:latin typeface="+mn-lt"/>
-              </a:rPr>
-              <a:t> </a:t>
-            </a:r>
-            <a:r>
-              <a:rPr lang="et-EE" sz="4000" err="1" smtClean="0">
+              <a:rPr lang="et-EE" sz="4000" dirty="0" smtClean="0">
+                <a:latin typeface="+mn-lt"/>
+              </a:rPr>
+              <a:t> </a:t>
+            </a:r>
+            <a:r>
+              <a:rPr lang="et-EE" sz="4000" dirty="0" err="1" smtClean="0">
                 <a:latin typeface="+mn-lt"/>
               </a:rPr>
               <a:t>dealing</a:t>
             </a:r>
             <a:r>
-              <a:rPr lang="et-EE" sz="4000" smtClean="0">
-                <a:latin typeface="+mn-lt"/>
-              </a:rPr>
-              <a:t> </a:t>
-            </a:r>
-            <a:r>
-              <a:rPr lang="et-EE" sz="4000" err="1" smtClean="0">
+              <a:rPr lang="et-EE" sz="4000" dirty="0" smtClean="0">
+                <a:latin typeface="+mn-lt"/>
+              </a:rPr>
+              <a:t> </a:t>
+            </a:r>
+            <a:r>
+              <a:rPr lang="et-EE" sz="4000" dirty="0" err="1" smtClean="0">
                 <a:latin typeface="+mn-lt"/>
               </a:rPr>
               <a:t>with</a:t>
             </a:r>
             <a:r>
-              <a:rPr lang="et-EE" sz="4000" smtClean="0">
-                <a:latin typeface="+mn-lt"/>
-              </a:rPr>
-              <a:t> </a:t>
-            </a:r>
-            <a:r>
-              <a:rPr lang="et-EE" sz="4000" err="1" smtClean="0">
+              <a:rPr lang="et-EE" sz="4000" dirty="0" smtClean="0">
+                <a:latin typeface="+mn-lt"/>
+              </a:rPr>
+              <a:t> </a:t>
+            </a:r>
+            <a:r>
+              <a:rPr lang="et-EE" sz="4000" dirty="0" err="1" smtClean="0">
                 <a:latin typeface="+mn-lt"/>
               </a:rPr>
               <a:t>those</a:t>
             </a:r>
             <a:r>
-              <a:rPr lang="et-EE" sz="4000" smtClean="0">
+              <a:rPr lang="et-EE" sz="4000" dirty="0" smtClean="0">
                 <a:latin typeface="+mn-lt"/>
               </a:rPr>
               <a:t>. </a:t>
             </a:r>
             <a:r>
-              <a:rPr lang="et-EE" sz="4000" err="1" smtClean="0">
+              <a:rPr lang="et-EE" sz="4000" dirty="0" err="1" smtClean="0">
                 <a:latin typeface="+mn-lt"/>
               </a:rPr>
               <a:t>However</a:t>
             </a:r>
             <a:r>
-              <a:rPr lang="et-EE" sz="4000" smtClean="0">
+              <a:rPr lang="et-EE" sz="4000" dirty="0" smtClean="0">
                 <a:latin typeface="+mn-lt"/>
               </a:rPr>
               <a:t>, </a:t>
             </a:r>
             <a:r>
-              <a:rPr lang="et-EE" sz="4000" err="1" smtClean="0">
+              <a:rPr lang="et-EE" sz="4000" dirty="0" err="1" smtClean="0">
                 <a:latin typeface="+mn-lt"/>
               </a:rPr>
               <a:t>the</a:t>
             </a:r>
             <a:r>
-              <a:rPr lang="et-EE" sz="4000" smtClean="0">
-                <a:latin typeface="+mn-lt"/>
-              </a:rPr>
-              <a:t> </a:t>
-            </a:r>
-            <a:r>
-              <a:rPr lang="et-EE" sz="4000" err="1" smtClean="0">
+              <a:rPr lang="et-EE" sz="4000" dirty="0" smtClean="0">
+                <a:latin typeface="+mn-lt"/>
+              </a:rPr>
+              <a:t> </a:t>
+            </a:r>
+            <a:r>
+              <a:rPr lang="et-EE" sz="4000" dirty="0" err="1" smtClean="0">
                 <a:latin typeface="+mn-lt"/>
               </a:rPr>
               <a:t>large</a:t>
             </a:r>
             <a:r>
-              <a:rPr lang="et-EE" sz="4000" smtClean="0">
-                <a:latin typeface="+mn-lt"/>
-              </a:rPr>
-              <a:t> </a:t>
-            </a:r>
-            <a:r>
-              <a:rPr lang="et-EE" sz="4000" err="1" smtClean="0">
+              <a:rPr lang="et-EE" sz="4000" dirty="0" smtClean="0">
+                <a:latin typeface="+mn-lt"/>
+              </a:rPr>
+              <a:t> </a:t>
+            </a:r>
+            <a:r>
+              <a:rPr lang="et-EE" sz="4000" dirty="0" err="1" smtClean="0">
                 <a:latin typeface="+mn-lt"/>
               </a:rPr>
               <a:t>dataset</a:t>
             </a:r>
             <a:r>
-              <a:rPr lang="et-EE" sz="4000" smtClean="0">
-                <a:latin typeface="+mn-lt"/>
-              </a:rPr>
-              <a:t> </a:t>
-            </a:r>
-            <a:r>
-              <a:rPr lang="et-EE" sz="4000" err="1" smtClean="0">
+              <a:rPr lang="et-EE" sz="4000" dirty="0" smtClean="0">
+                <a:latin typeface="+mn-lt"/>
+              </a:rPr>
+              <a:t> </a:t>
+            </a:r>
+            <a:r>
+              <a:rPr lang="et-EE" sz="4000" dirty="0" err="1" smtClean="0">
                 <a:latin typeface="+mn-lt"/>
               </a:rPr>
               <a:t>had</a:t>
             </a:r>
             <a:r>
-              <a:rPr lang="et-EE" sz="4000" smtClean="0">
-                <a:latin typeface="+mn-lt"/>
-              </a:rPr>
-              <a:t> </a:t>
-            </a:r>
-            <a:r>
-              <a:rPr lang="et-EE" sz="4000" err="1" smtClean="0">
+              <a:rPr lang="et-EE" sz="4000" dirty="0" smtClean="0">
+                <a:latin typeface="+mn-lt"/>
+              </a:rPr>
+              <a:t> </a:t>
+            </a:r>
+            <a:r>
+              <a:rPr lang="et-EE" sz="4000" dirty="0" err="1" smtClean="0">
                 <a:latin typeface="+mn-lt"/>
               </a:rPr>
               <a:t>some</a:t>
             </a:r>
             <a:r>
-              <a:rPr lang="et-EE" sz="4000" smtClean="0">
-                <a:latin typeface="+mn-lt"/>
-              </a:rPr>
-              <a:t> </a:t>
-            </a:r>
-            <a:r>
-              <a:rPr lang="et-EE" sz="4000" err="1" smtClean="0">
+              <a:rPr lang="et-EE" sz="4000" dirty="0" smtClean="0">
+                <a:latin typeface="+mn-lt"/>
+              </a:rPr>
+              <a:t> </a:t>
+            </a:r>
+            <a:r>
+              <a:rPr lang="et-EE" sz="4000" dirty="0" err="1" smtClean="0">
                 <a:latin typeface="+mn-lt"/>
               </a:rPr>
               <a:t>duplicate</a:t>
             </a:r>
             <a:r>
-              <a:rPr lang="et-EE" sz="4000" smtClean="0">
-                <a:latin typeface="+mn-lt"/>
-              </a:rPr>
-              <a:t> </a:t>
-            </a:r>
-            <a:r>
-              <a:rPr lang="et-EE" sz="4000" err="1" smtClean="0">
+              <a:rPr lang="et-EE" sz="4000" dirty="0" smtClean="0">
+                <a:latin typeface="+mn-lt"/>
+              </a:rPr>
+              <a:t> </a:t>
+            </a:r>
+            <a:r>
+              <a:rPr lang="et-EE" sz="4000" dirty="0" err="1" smtClean="0">
                 <a:latin typeface="+mn-lt"/>
               </a:rPr>
               <a:t>rows</a:t>
             </a:r>
             <a:r>
-              <a:rPr lang="et-EE" sz="4000" smtClean="0">
+              <a:rPr lang="et-EE" sz="4000" dirty="0" smtClean="0">
                 <a:latin typeface="+mn-lt"/>
               </a:rPr>
               <a:t>, so </a:t>
             </a:r>
             <a:r>
-              <a:rPr lang="et-EE" sz="4000" err="1" smtClean="0">
+              <a:rPr lang="et-EE" sz="4000" dirty="0" err="1" smtClean="0">
                 <a:latin typeface="+mn-lt"/>
               </a:rPr>
               <a:t>we</a:t>
             </a:r>
             <a:r>
-              <a:rPr lang="et-EE" sz="4000" smtClean="0">
-                <a:latin typeface="+mn-lt"/>
-              </a:rPr>
-              <a:t> </a:t>
-            </a:r>
-            <a:r>
-              <a:rPr lang="et-EE" sz="4000" err="1" smtClean="0">
+              <a:rPr lang="et-EE" sz="4000" dirty="0" smtClean="0">
+                <a:latin typeface="+mn-lt"/>
+              </a:rPr>
+              <a:t> </a:t>
+            </a:r>
+            <a:r>
+              <a:rPr lang="et-EE" sz="4000" dirty="0" err="1" smtClean="0">
                 <a:latin typeface="+mn-lt"/>
               </a:rPr>
               <a:t>had</a:t>
             </a:r>
             <a:r>
-              <a:rPr lang="et-EE" sz="4000" smtClean="0">
-                <a:latin typeface="+mn-lt"/>
-              </a:rPr>
-              <a:t> </a:t>
-            </a:r>
-            <a:r>
-              <a:rPr lang="et-EE" sz="4000" err="1" smtClean="0">
+              <a:rPr lang="et-EE" sz="4000" dirty="0" smtClean="0">
+                <a:latin typeface="+mn-lt"/>
+              </a:rPr>
+              <a:t> </a:t>
+            </a:r>
+            <a:r>
+              <a:rPr lang="et-EE" sz="4000" dirty="0" err="1" smtClean="0">
                 <a:latin typeface="+mn-lt"/>
               </a:rPr>
               <a:t>to</a:t>
             </a:r>
             <a:r>
-              <a:rPr lang="et-EE" sz="4000" smtClean="0">
-                <a:latin typeface="+mn-lt"/>
-              </a:rPr>
-              <a:t> </a:t>
-            </a:r>
-            <a:r>
-              <a:rPr lang="et-EE" sz="4000" err="1" smtClean="0">
+              <a:rPr lang="et-EE" sz="4000" dirty="0" smtClean="0">
+                <a:latin typeface="+mn-lt"/>
+              </a:rPr>
+              <a:t> </a:t>
+            </a:r>
+            <a:r>
+              <a:rPr lang="et-EE" sz="4000" dirty="0" err="1" smtClean="0">
                 <a:latin typeface="+mn-lt"/>
               </a:rPr>
               <a:t>remove</a:t>
             </a:r>
             <a:r>
-              <a:rPr lang="et-EE" sz="4000" smtClean="0">
-                <a:latin typeface="+mn-lt"/>
-              </a:rPr>
-              <a:t> </a:t>
-            </a:r>
-            <a:r>
-              <a:rPr lang="et-EE" sz="4000" err="1" smtClean="0">
+              <a:rPr lang="et-EE" sz="4000" dirty="0" smtClean="0">
+                <a:latin typeface="+mn-lt"/>
+              </a:rPr>
+              <a:t> </a:t>
+            </a:r>
+            <a:r>
+              <a:rPr lang="et-EE" sz="4000" dirty="0" err="1" smtClean="0">
                 <a:latin typeface="+mn-lt"/>
               </a:rPr>
               <a:t>them</a:t>
             </a:r>
             <a:r>
-              <a:rPr lang="et-EE" sz="4000" smtClean="0">
+              <a:rPr lang="et-EE" sz="4000" dirty="0" smtClean="0">
                 <a:latin typeface="+mn-lt"/>
               </a:rPr>
               <a:t>.</a:t>
@@ -4713,277 +4713,277 @@
           <a:p>
             <a:pPr algn="just" eaLnBrk="1" hangingPunct="1"/>
             <a:r>
-              <a:rPr lang="et-EE" sz="4000" err="1" smtClean="0">
+              <a:rPr lang="et-EE" sz="4000" dirty="0" err="1" smtClean="0">
                 <a:latin typeface="+mn-lt"/>
               </a:rPr>
               <a:t>Although</a:t>
             </a:r>
             <a:r>
-              <a:rPr lang="et-EE" sz="4000" smtClean="0">
-                <a:latin typeface="+mn-lt"/>
-              </a:rPr>
-              <a:t> </a:t>
-            </a:r>
-            <a:r>
-              <a:rPr lang="et-EE" sz="4000" err="1" smtClean="0">
+              <a:rPr lang="et-EE" sz="4000" dirty="0" smtClean="0">
+                <a:latin typeface="+mn-lt"/>
+              </a:rPr>
+              <a:t> </a:t>
+            </a:r>
+            <a:r>
+              <a:rPr lang="et-EE" sz="4000" dirty="0" err="1" smtClean="0">
                 <a:latin typeface="+mn-lt"/>
               </a:rPr>
               <a:t>the</a:t>
             </a:r>
             <a:r>
-              <a:rPr lang="et-EE" sz="4000" smtClean="0">
-                <a:latin typeface="+mn-lt"/>
-              </a:rPr>
-              <a:t> </a:t>
-            </a:r>
-            <a:r>
-              <a:rPr lang="et-EE" sz="4000" err="1" smtClean="0">
+              <a:rPr lang="et-EE" sz="4000" dirty="0" smtClean="0">
+                <a:latin typeface="+mn-lt"/>
+              </a:rPr>
+              <a:t> </a:t>
+            </a:r>
+            <a:r>
+              <a:rPr lang="et-EE" sz="4000" dirty="0" err="1" smtClean="0">
                 <a:latin typeface="+mn-lt"/>
               </a:rPr>
               <a:t>attributes</a:t>
             </a:r>
             <a:r>
-              <a:rPr lang="et-EE" sz="4000" smtClean="0">
+              <a:rPr lang="et-EE" sz="4000" dirty="0" smtClean="0">
                 <a:latin typeface="+mn-lt"/>
               </a:rPr>
               <a:t> in </a:t>
             </a:r>
             <a:r>
-              <a:rPr lang="et-EE" sz="4000" err="1" smtClean="0">
+              <a:rPr lang="et-EE" sz="4000" dirty="0" err="1" smtClean="0">
                 <a:latin typeface="+mn-lt"/>
               </a:rPr>
               <a:t>the</a:t>
             </a:r>
             <a:r>
-              <a:rPr lang="et-EE" sz="4000" smtClean="0">
-                <a:latin typeface="+mn-lt"/>
-              </a:rPr>
-              <a:t> </a:t>
-            </a:r>
-            <a:r>
-              <a:rPr lang="et-EE" sz="4000" err="1" smtClean="0">
+              <a:rPr lang="et-EE" sz="4000" dirty="0" smtClean="0">
+                <a:latin typeface="+mn-lt"/>
+              </a:rPr>
+              <a:t> </a:t>
+            </a:r>
+            <a:r>
+              <a:rPr lang="et-EE" sz="4000" dirty="0" err="1" smtClean="0">
                 <a:latin typeface="+mn-lt"/>
               </a:rPr>
               <a:t>different</a:t>
             </a:r>
             <a:r>
-              <a:rPr lang="et-EE" sz="4000" smtClean="0">
-                <a:latin typeface="+mn-lt"/>
-              </a:rPr>
-              <a:t> </a:t>
-            </a:r>
-            <a:r>
-              <a:rPr lang="et-EE" sz="4000" err="1" smtClean="0">
+              <a:rPr lang="et-EE" sz="4000" dirty="0" smtClean="0">
+                <a:latin typeface="+mn-lt"/>
+              </a:rPr>
+              <a:t> </a:t>
+            </a:r>
+            <a:r>
+              <a:rPr lang="et-EE" sz="4000" dirty="0" err="1" smtClean="0">
                 <a:latin typeface="+mn-lt"/>
               </a:rPr>
               <a:t>datasets</a:t>
             </a:r>
             <a:r>
-              <a:rPr lang="et-EE" sz="4000" smtClean="0">
-                <a:latin typeface="+mn-lt"/>
-              </a:rPr>
-              <a:t> </a:t>
-            </a:r>
-            <a:r>
-              <a:rPr lang="et-EE" sz="4000" err="1" smtClean="0">
+              <a:rPr lang="et-EE" sz="4000" dirty="0" smtClean="0">
+                <a:latin typeface="+mn-lt"/>
+              </a:rPr>
+              <a:t> </a:t>
+            </a:r>
+            <a:r>
+              <a:rPr lang="et-EE" sz="4000" dirty="0" err="1" smtClean="0">
                 <a:latin typeface="+mn-lt"/>
               </a:rPr>
               <a:t>were</a:t>
             </a:r>
             <a:r>
-              <a:rPr lang="et-EE" sz="4000" smtClean="0">
-                <a:latin typeface="+mn-lt"/>
-              </a:rPr>
-              <a:t> </a:t>
-            </a:r>
-            <a:r>
-              <a:rPr lang="et-EE" sz="4000" err="1" smtClean="0">
+              <a:rPr lang="et-EE" sz="4000" dirty="0" smtClean="0">
+                <a:latin typeface="+mn-lt"/>
+              </a:rPr>
+              <a:t> </a:t>
+            </a:r>
+            <a:r>
+              <a:rPr lang="et-EE" sz="4000" dirty="0" err="1" smtClean="0">
                 <a:latin typeface="+mn-lt"/>
               </a:rPr>
               <a:t>the</a:t>
             </a:r>
             <a:r>
-              <a:rPr lang="et-EE" sz="4000" smtClean="0">
-                <a:latin typeface="+mn-lt"/>
-              </a:rPr>
-              <a:t> </a:t>
-            </a:r>
-            <a:r>
-              <a:rPr lang="et-EE" sz="4000" err="1" smtClean="0">
+              <a:rPr lang="et-EE" sz="4000" dirty="0" smtClean="0">
+                <a:latin typeface="+mn-lt"/>
+              </a:rPr>
+              <a:t> </a:t>
+            </a:r>
+            <a:r>
+              <a:rPr lang="et-EE" sz="4000" dirty="0" err="1" smtClean="0">
                 <a:latin typeface="+mn-lt"/>
               </a:rPr>
               <a:t>same</a:t>
             </a:r>
             <a:r>
-              <a:rPr lang="et-EE" sz="4000" smtClean="0">
+              <a:rPr lang="et-EE" sz="4000" dirty="0" smtClean="0">
                 <a:latin typeface="+mn-lt"/>
               </a:rPr>
               <a:t>, </a:t>
             </a:r>
             <a:r>
-              <a:rPr lang="et-EE" sz="4000" err="1" smtClean="0">
+              <a:rPr lang="et-EE" sz="4000" dirty="0" err="1" smtClean="0">
                 <a:latin typeface="+mn-lt"/>
               </a:rPr>
               <a:t>there</a:t>
             </a:r>
             <a:r>
-              <a:rPr lang="et-EE" sz="4000" smtClean="0">
-                <a:latin typeface="+mn-lt"/>
-              </a:rPr>
-              <a:t> </a:t>
-            </a:r>
-            <a:r>
-              <a:rPr lang="et-EE" sz="4000" err="1" smtClean="0">
+              <a:rPr lang="et-EE" sz="4000" dirty="0" smtClean="0">
+                <a:latin typeface="+mn-lt"/>
+              </a:rPr>
+              <a:t> </a:t>
+            </a:r>
+            <a:r>
+              <a:rPr lang="et-EE" sz="4000" dirty="0" err="1" smtClean="0">
                 <a:latin typeface="+mn-lt"/>
               </a:rPr>
               <a:t>were</a:t>
             </a:r>
             <a:r>
-              <a:rPr lang="et-EE" sz="4000" smtClean="0">
-                <a:latin typeface="+mn-lt"/>
-              </a:rPr>
-              <a:t> </a:t>
-            </a:r>
-            <a:r>
-              <a:rPr lang="et-EE" sz="4000" err="1" smtClean="0">
+              <a:rPr lang="et-EE" sz="4000" dirty="0" smtClean="0">
+                <a:latin typeface="+mn-lt"/>
+              </a:rPr>
+              <a:t> </a:t>
+            </a:r>
+            <a:r>
+              <a:rPr lang="et-EE" sz="4000" dirty="0" err="1" smtClean="0">
                 <a:latin typeface="+mn-lt"/>
               </a:rPr>
               <a:t>some</a:t>
             </a:r>
             <a:r>
-              <a:rPr lang="et-EE" sz="4000" smtClean="0">
-                <a:latin typeface="+mn-lt"/>
-              </a:rPr>
-              <a:t> </a:t>
-            </a:r>
-            <a:r>
-              <a:rPr lang="et-EE" sz="4000" err="1" smtClean="0">
+              <a:rPr lang="et-EE" sz="4000" dirty="0" smtClean="0">
+                <a:latin typeface="+mn-lt"/>
+              </a:rPr>
+              <a:t> </a:t>
+            </a:r>
+            <a:r>
+              <a:rPr lang="et-EE" sz="4000" dirty="0" err="1" smtClean="0">
                 <a:latin typeface="+mn-lt"/>
               </a:rPr>
               <a:t>that</a:t>
             </a:r>
             <a:r>
-              <a:rPr lang="et-EE" sz="4000" smtClean="0">
-                <a:latin typeface="+mn-lt"/>
-              </a:rPr>
-              <a:t> </a:t>
-            </a:r>
-            <a:r>
-              <a:rPr lang="et-EE" sz="4000" err="1" smtClean="0">
+              <a:rPr lang="et-EE" sz="4000" dirty="0" smtClean="0">
+                <a:latin typeface="+mn-lt"/>
+              </a:rPr>
+              <a:t> </a:t>
+            </a:r>
+            <a:r>
+              <a:rPr lang="et-EE" sz="4000" dirty="0" err="1" smtClean="0">
                 <a:latin typeface="+mn-lt"/>
               </a:rPr>
               <a:t>were</a:t>
             </a:r>
             <a:r>
-              <a:rPr lang="et-EE" sz="4000" smtClean="0">
-                <a:latin typeface="+mn-lt"/>
-              </a:rPr>
-              <a:t> </a:t>
-            </a:r>
-            <a:r>
-              <a:rPr lang="et-EE" sz="4000" err="1" smtClean="0">
+              <a:rPr lang="et-EE" sz="4000" dirty="0" smtClean="0">
+                <a:latin typeface="+mn-lt"/>
+              </a:rPr>
+              <a:t> </a:t>
+            </a:r>
+            <a:r>
+              <a:rPr lang="et-EE" sz="4000" dirty="0" err="1" smtClean="0">
                 <a:latin typeface="+mn-lt"/>
               </a:rPr>
               <a:t>named</a:t>
             </a:r>
             <a:r>
-              <a:rPr lang="et-EE" sz="4000" smtClean="0">
-                <a:latin typeface="+mn-lt"/>
-              </a:rPr>
-              <a:t> </a:t>
-            </a:r>
-            <a:r>
-              <a:rPr lang="et-EE" sz="4000" err="1" smtClean="0">
+              <a:rPr lang="et-EE" sz="4000" dirty="0" smtClean="0">
+                <a:latin typeface="+mn-lt"/>
+              </a:rPr>
+              <a:t> </a:t>
+            </a:r>
+            <a:r>
+              <a:rPr lang="et-EE" sz="4000" dirty="0" err="1" smtClean="0">
                 <a:latin typeface="+mn-lt"/>
               </a:rPr>
               <a:t>slightly</a:t>
             </a:r>
             <a:r>
-              <a:rPr lang="et-EE" sz="4000" smtClean="0">
-                <a:latin typeface="+mn-lt"/>
-              </a:rPr>
-              <a:t> </a:t>
-            </a:r>
-            <a:r>
-              <a:rPr lang="et-EE" sz="4000" err="1" smtClean="0">
+              <a:rPr lang="et-EE" sz="4000" dirty="0" smtClean="0">
+                <a:latin typeface="+mn-lt"/>
+              </a:rPr>
+              <a:t> </a:t>
+            </a:r>
+            <a:r>
+              <a:rPr lang="et-EE" sz="4000" dirty="0" err="1" smtClean="0">
                 <a:latin typeface="+mn-lt"/>
               </a:rPr>
               <a:t>differently</a:t>
             </a:r>
             <a:r>
-              <a:rPr lang="et-EE" sz="4000" smtClean="0">
+              <a:rPr lang="et-EE" sz="4000" dirty="0" smtClean="0">
                 <a:latin typeface="+mn-lt"/>
               </a:rPr>
               <a:t>, so </a:t>
             </a:r>
             <a:r>
-              <a:rPr lang="et-EE" sz="4000" err="1" smtClean="0">
+              <a:rPr lang="et-EE" sz="4000" dirty="0" err="1" smtClean="0">
                 <a:latin typeface="+mn-lt"/>
               </a:rPr>
               <a:t>we</a:t>
             </a:r>
             <a:r>
-              <a:rPr lang="et-EE" sz="4000" smtClean="0">
-                <a:latin typeface="+mn-lt"/>
-              </a:rPr>
-              <a:t> </a:t>
-            </a:r>
-            <a:r>
-              <a:rPr lang="et-EE" sz="4000" err="1" smtClean="0">
+              <a:rPr lang="et-EE" sz="4000" dirty="0" smtClean="0">
+                <a:latin typeface="+mn-lt"/>
+              </a:rPr>
+              <a:t> </a:t>
+            </a:r>
+            <a:r>
+              <a:rPr lang="et-EE" sz="4000" dirty="0" err="1" smtClean="0">
                 <a:latin typeface="+mn-lt"/>
               </a:rPr>
               <a:t>had</a:t>
             </a:r>
             <a:r>
-              <a:rPr lang="et-EE" sz="4000" smtClean="0">
-                <a:latin typeface="+mn-lt"/>
-              </a:rPr>
-              <a:t> </a:t>
-            </a:r>
-            <a:r>
-              <a:rPr lang="et-EE" sz="4000" err="1" smtClean="0">
+              <a:rPr lang="et-EE" sz="4000" dirty="0" smtClean="0">
+                <a:latin typeface="+mn-lt"/>
+              </a:rPr>
+              <a:t> </a:t>
+            </a:r>
+            <a:r>
+              <a:rPr lang="et-EE" sz="4000" dirty="0" err="1" smtClean="0">
                 <a:latin typeface="+mn-lt"/>
               </a:rPr>
               <a:t>to</a:t>
             </a:r>
             <a:r>
-              <a:rPr lang="et-EE" sz="4000" smtClean="0">
+              <a:rPr lang="et-EE" sz="4000" dirty="0" smtClean="0">
                 <a:latin typeface="+mn-lt"/>
               </a:rPr>
               <a:t> take </a:t>
             </a:r>
             <a:r>
-              <a:rPr lang="et-EE" sz="4000" err="1" smtClean="0">
+              <a:rPr lang="et-EE" sz="4000" dirty="0" err="1" smtClean="0">
                 <a:latin typeface="+mn-lt"/>
               </a:rPr>
               <a:t>that</a:t>
             </a:r>
             <a:r>
-              <a:rPr lang="et-EE" sz="4000" smtClean="0">
-                <a:latin typeface="+mn-lt"/>
-              </a:rPr>
-              <a:t> </a:t>
-            </a:r>
-            <a:r>
-              <a:rPr lang="et-EE" sz="4000" err="1" smtClean="0">
+              <a:rPr lang="et-EE" sz="4000" dirty="0" smtClean="0">
+                <a:latin typeface="+mn-lt"/>
+              </a:rPr>
+              <a:t> </a:t>
+            </a:r>
+            <a:r>
+              <a:rPr lang="et-EE" sz="4000" dirty="0" err="1" smtClean="0">
                 <a:latin typeface="+mn-lt"/>
               </a:rPr>
               <a:t>into</a:t>
             </a:r>
             <a:r>
-              <a:rPr lang="et-EE" sz="4000" smtClean="0">
-                <a:latin typeface="+mn-lt"/>
-              </a:rPr>
-              <a:t> </a:t>
-            </a:r>
-            <a:r>
-              <a:rPr lang="et-EE" sz="4000" err="1" smtClean="0">
+              <a:rPr lang="et-EE" sz="4000" dirty="0" smtClean="0">
+                <a:latin typeface="+mn-lt"/>
+              </a:rPr>
+              <a:t> </a:t>
+            </a:r>
+            <a:r>
+              <a:rPr lang="et-EE" sz="4000" dirty="0" err="1" smtClean="0">
                 <a:latin typeface="+mn-lt"/>
               </a:rPr>
               <a:t>consideration</a:t>
             </a:r>
             <a:r>
-              <a:rPr lang="et-EE" sz="4000" smtClean="0">
+              <a:rPr lang="et-EE" sz="4000" dirty="0" smtClean="0">
                 <a:latin typeface="+mn-lt"/>
               </a:rPr>
               <a:t>.</a:t>
@@ -4992,414 +4992,408 @@
           <a:p>
             <a:pPr algn="just" eaLnBrk="1" hangingPunct="1"/>
             <a:r>
-              <a:rPr lang="et-EE" sz="4000" err="1" smtClean="0">
+              <a:rPr lang="et-EE" sz="4000" dirty="0" err="1" smtClean="0">
                 <a:latin typeface="+mn-lt"/>
               </a:rPr>
               <a:t>We</a:t>
             </a:r>
             <a:r>
-              <a:rPr lang="et-EE" sz="4000" smtClean="0">
-                <a:latin typeface="+mn-lt"/>
-              </a:rPr>
-              <a:t> </a:t>
-            </a:r>
-            <a:r>
-              <a:rPr lang="et-EE" sz="4000" err="1" smtClean="0">
+              <a:rPr lang="et-EE" sz="4000" dirty="0" smtClean="0">
+                <a:latin typeface="+mn-lt"/>
+              </a:rPr>
+              <a:t> </a:t>
+            </a:r>
+            <a:r>
+              <a:rPr lang="et-EE" sz="4000" dirty="0" err="1" smtClean="0">
                 <a:latin typeface="+mn-lt"/>
               </a:rPr>
               <a:t>also</a:t>
             </a:r>
             <a:r>
-              <a:rPr lang="et-EE" sz="4000" smtClean="0">
-                <a:latin typeface="+mn-lt"/>
-              </a:rPr>
-              <a:t> </a:t>
-            </a:r>
-            <a:r>
-              <a:rPr lang="et-EE" sz="4000" err="1" smtClean="0">
+              <a:rPr lang="et-EE" sz="4000" dirty="0" smtClean="0">
+                <a:latin typeface="+mn-lt"/>
+              </a:rPr>
+              <a:t> </a:t>
+            </a:r>
+            <a:r>
+              <a:rPr lang="et-EE" sz="4000" dirty="0" err="1" smtClean="0">
                 <a:latin typeface="+mn-lt"/>
               </a:rPr>
               <a:t>noticed</a:t>
             </a:r>
             <a:r>
-              <a:rPr lang="et-EE" sz="4000" smtClean="0">
+              <a:rPr lang="et-EE" sz="4000" dirty="0" smtClean="0">
                 <a:latin typeface="+mn-lt"/>
               </a:rPr>
               <a:t>, </a:t>
             </a:r>
             <a:r>
-              <a:rPr lang="et-EE" sz="4000" err="1" smtClean="0">
+              <a:rPr lang="et-EE" sz="4000" dirty="0" err="1" smtClean="0">
                 <a:latin typeface="+mn-lt"/>
               </a:rPr>
               <a:t>that</a:t>
             </a:r>
             <a:r>
-              <a:rPr lang="et-EE" sz="4000" smtClean="0">
-                <a:latin typeface="+mn-lt"/>
-              </a:rPr>
-              <a:t> </a:t>
-            </a:r>
-            <a:r>
-              <a:rPr lang="et-EE" sz="4000" err="1" smtClean="0">
+              <a:rPr lang="et-EE" sz="4000" dirty="0" smtClean="0">
+                <a:latin typeface="+mn-lt"/>
+              </a:rPr>
+              <a:t> </a:t>
+            </a:r>
+            <a:r>
+              <a:rPr lang="et-EE" sz="4000" dirty="0" err="1" smtClean="0">
                 <a:latin typeface="+mn-lt"/>
               </a:rPr>
               <a:t>the</a:t>
             </a:r>
             <a:r>
-              <a:rPr lang="et-EE" sz="4000" smtClean="0">
-                <a:latin typeface="+mn-lt"/>
-              </a:rPr>
-              <a:t> </a:t>
-            </a:r>
-            <a:r>
-              <a:rPr lang="et-EE" sz="4000" err="1" smtClean="0">
+              <a:rPr lang="et-EE" sz="4000" dirty="0" smtClean="0">
+                <a:latin typeface="+mn-lt"/>
+              </a:rPr>
+              <a:t> </a:t>
+            </a:r>
+            <a:r>
+              <a:rPr lang="et-EE" sz="4000" dirty="0" err="1" smtClean="0">
                 <a:latin typeface="+mn-lt"/>
               </a:rPr>
               <a:t>best</a:t>
             </a:r>
             <a:r>
-              <a:rPr lang="et-EE" sz="4000" smtClean="0">
-                <a:latin typeface="+mn-lt"/>
-              </a:rPr>
-              <a:t> </a:t>
-            </a:r>
-            <a:r>
-              <a:rPr lang="et-EE" sz="4000" err="1" smtClean="0">
+              <a:rPr lang="et-EE" sz="4000" dirty="0" smtClean="0">
+                <a:latin typeface="+mn-lt"/>
+              </a:rPr>
+              <a:t> </a:t>
+            </a:r>
+            <a:r>
+              <a:rPr lang="et-EE" sz="4000" dirty="0" err="1" smtClean="0">
                 <a:latin typeface="+mn-lt"/>
               </a:rPr>
               <a:t>results</a:t>
             </a:r>
             <a:r>
-              <a:rPr lang="et-EE" sz="4000" smtClean="0">
-                <a:latin typeface="+mn-lt"/>
-              </a:rPr>
-              <a:t> </a:t>
-            </a:r>
-            <a:r>
-              <a:rPr lang="et-EE" sz="4000" err="1" smtClean="0">
+              <a:rPr lang="et-EE" sz="4000" dirty="0" smtClean="0">
+                <a:latin typeface="+mn-lt"/>
+              </a:rPr>
+              <a:t> </a:t>
+            </a:r>
+            <a:r>
+              <a:rPr lang="et-EE" sz="4000" dirty="0" err="1" smtClean="0">
                 <a:latin typeface="+mn-lt"/>
               </a:rPr>
               <a:t>were</a:t>
             </a:r>
             <a:r>
-              <a:rPr lang="et-EE" sz="4000" smtClean="0">
-                <a:latin typeface="+mn-lt"/>
-              </a:rPr>
-              <a:t> </a:t>
-            </a:r>
-            <a:r>
-              <a:rPr lang="et-EE" sz="4000" err="1" smtClean="0">
-                <a:latin typeface="+mn-lt"/>
-              </a:rPr>
-              <a:t>obtained</a:t>
-            </a:r>
-            <a:r>
-              <a:rPr lang="et-EE" sz="4000" smtClean="0">
-                <a:latin typeface="+mn-lt"/>
-              </a:rPr>
-              <a:t>, </a:t>
-            </a:r>
-            <a:r>
-              <a:rPr lang="et-EE" sz="4000" err="1" smtClean="0">
+              <a:rPr lang="et-EE" sz="4000" dirty="0" smtClean="0">
+                <a:latin typeface="+mn-lt"/>
+              </a:rPr>
+              <a:t> </a:t>
+            </a:r>
+            <a:r>
+              <a:rPr lang="et-EE" sz="4000" smtClean="0">
+                <a:latin typeface="+mn-lt"/>
+              </a:rPr>
+              <a:t>obtained </a:t>
+            </a:r>
+            <a:r>
+              <a:rPr lang="et-EE" sz="4000" dirty="0" err="1" smtClean="0">
                 <a:latin typeface="+mn-lt"/>
               </a:rPr>
               <a:t>when</a:t>
             </a:r>
             <a:r>
-              <a:rPr lang="et-EE" sz="4000" smtClean="0">
-                <a:latin typeface="+mn-lt"/>
-              </a:rPr>
-              <a:t> </a:t>
-            </a:r>
-            <a:r>
-              <a:rPr lang="et-EE" sz="4000" err="1" smtClean="0">
+              <a:rPr lang="et-EE" sz="4000" dirty="0" smtClean="0">
+                <a:latin typeface="+mn-lt"/>
+              </a:rPr>
+              <a:t> </a:t>
+            </a:r>
+            <a:r>
+              <a:rPr lang="et-EE" sz="4000" dirty="0" err="1" smtClean="0">
                 <a:latin typeface="+mn-lt"/>
               </a:rPr>
               <a:t>we</a:t>
             </a:r>
             <a:r>
-              <a:rPr lang="et-EE" sz="4000" smtClean="0">
-                <a:latin typeface="+mn-lt"/>
-              </a:rPr>
-              <a:t> </a:t>
-            </a:r>
-            <a:r>
-              <a:rPr lang="et-EE" sz="4000" err="1" smtClean="0">
+              <a:rPr lang="et-EE" sz="4000" dirty="0" smtClean="0">
+                <a:latin typeface="+mn-lt"/>
+              </a:rPr>
+              <a:t> </a:t>
+            </a:r>
+            <a:r>
+              <a:rPr lang="et-EE" sz="4000" dirty="0" err="1" smtClean="0">
                 <a:latin typeface="+mn-lt"/>
               </a:rPr>
               <a:t>only</a:t>
             </a:r>
             <a:r>
-              <a:rPr lang="et-EE" sz="4000" smtClean="0">
-                <a:latin typeface="+mn-lt"/>
-              </a:rPr>
-              <a:t> </a:t>
-            </a:r>
-            <a:r>
-              <a:rPr lang="et-EE" sz="4000" err="1" smtClean="0">
+              <a:rPr lang="et-EE" sz="4000" dirty="0" smtClean="0">
+                <a:latin typeface="+mn-lt"/>
+              </a:rPr>
+              <a:t> </a:t>
+            </a:r>
+            <a:r>
+              <a:rPr lang="et-EE" sz="4000" dirty="0" err="1" smtClean="0">
                 <a:latin typeface="+mn-lt"/>
               </a:rPr>
               <a:t>used</a:t>
             </a:r>
             <a:r>
-              <a:rPr lang="et-EE" sz="4000" smtClean="0">
-                <a:latin typeface="+mn-lt"/>
-              </a:rPr>
-              <a:t> </a:t>
-            </a:r>
-            <a:r>
-              <a:rPr lang="et-EE" sz="4000" err="1" smtClean="0">
+              <a:rPr lang="et-EE" sz="4000" dirty="0" smtClean="0">
+                <a:latin typeface="+mn-lt"/>
+              </a:rPr>
+              <a:t> </a:t>
+            </a:r>
+            <a:r>
+              <a:rPr lang="et-EE" sz="4000" dirty="0" err="1" smtClean="0">
                 <a:latin typeface="+mn-lt"/>
               </a:rPr>
               <a:t>songs</a:t>
             </a:r>
             <a:r>
-              <a:rPr lang="et-EE" sz="4000" smtClean="0">
-                <a:latin typeface="+mn-lt"/>
-              </a:rPr>
-              <a:t> </a:t>
-            </a:r>
-            <a:r>
-              <a:rPr lang="et-EE" sz="4000" err="1" smtClean="0">
+              <a:rPr lang="et-EE" sz="4000" dirty="0" smtClean="0">
+                <a:latin typeface="+mn-lt"/>
+              </a:rPr>
+              <a:t> </a:t>
+            </a:r>
+            <a:r>
+              <a:rPr lang="et-EE" sz="4000" dirty="0" err="1" smtClean="0">
                 <a:latin typeface="+mn-lt"/>
               </a:rPr>
               <a:t>with</a:t>
             </a:r>
             <a:r>
-              <a:rPr lang="et-EE" sz="4000" smtClean="0">
-                <a:latin typeface="+mn-lt"/>
-              </a:rPr>
-              <a:t> </a:t>
-            </a:r>
-            <a:r>
-              <a:rPr lang="et-EE" sz="4000" err="1" smtClean="0">
+              <a:rPr lang="et-EE" sz="4000" dirty="0" smtClean="0">
+                <a:latin typeface="+mn-lt"/>
+              </a:rPr>
+              <a:t> </a:t>
+            </a:r>
+            <a:r>
+              <a:rPr lang="et-EE" sz="4000" dirty="0" err="1" smtClean="0">
                 <a:latin typeface="+mn-lt"/>
               </a:rPr>
               <a:t>popularity</a:t>
             </a:r>
             <a:r>
-              <a:rPr lang="et-EE" sz="4000" smtClean="0">
-                <a:latin typeface="+mn-lt"/>
-              </a:rPr>
-              <a:t> </a:t>
-            </a:r>
-            <a:r>
-              <a:rPr lang="et-EE" sz="4000" err="1" smtClean="0">
+              <a:rPr lang="et-EE" sz="4000" dirty="0" smtClean="0">
+                <a:latin typeface="+mn-lt"/>
+              </a:rPr>
+              <a:t> </a:t>
+            </a:r>
+            <a:r>
+              <a:rPr lang="et-EE" sz="4000" dirty="0" err="1" smtClean="0">
                 <a:latin typeface="+mn-lt"/>
               </a:rPr>
               <a:t>over</a:t>
             </a:r>
             <a:r>
-              <a:rPr lang="et-EE" sz="4000" smtClean="0">
+              <a:rPr lang="et-EE" sz="4000" dirty="0" smtClean="0">
                 <a:latin typeface="+mn-lt"/>
               </a:rPr>
               <a:t> 60 </a:t>
             </a:r>
             <a:r>
-              <a:rPr lang="et-EE" sz="4000" err="1" smtClean="0">
+              <a:rPr lang="et-EE" sz="4000" dirty="0" err="1" smtClean="0">
                 <a:latin typeface="+mn-lt"/>
               </a:rPr>
               <a:t>for</a:t>
             </a:r>
             <a:r>
-              <a:rPr lang="et-EE" sz="4000" smtClean="0">
-                <a:latin typeface="+mn-lt"/>
-              </a:rPr>
-              <a:t> </a:t>
-            </a:r>
-            <a:r>
-              <a:rPr lang="et-EE" sz="4000" err="1" smtClean="0">
+              <a:rPr lang="et-EE" sz="4000" dirty="0" smtClean="0">
+                <a:latin typeface="+mn-lt"/>
+              </a:rPr>
+              <a:t> </a:t>
+            </a:r>
+            <a:r>
+              <a:rPr lang="et-EE" sz="4000" dirty="0" err="1" smtClean="0">
                 <a:latin typeface="+mn-lt"/>
               </a:rPr>
               <a:t>popular</a:t>
             </a:r>
             <a:r>
-              <a:rPr lang="et-EE" sz="4000" smtClean="0">
+              <a:rPr lang="et-EE" sz="4000" dirty="0" smtClean="0">
                 <a:latin typeface="+mn-lt"/>
               </a:rPr>
               <a:t> and </a:t>
             </a:r>
             <a:r>
-              <a:rPr lang="et-EE" sz="4000" err="1" smtClean="0">
+              <a:rPr lang="et-EE" sz="4000" dirty="0" err="1" smtClean="0">
                 <a:latin typeface="+mn-lt"/>
               </a:rPr>
               <a:t>songs</a:t>
             </a:r>
             <a:r>
-              <a:rPr lang="et-EE" sz="4000" smtClean="0">
-                <a:latin typeface="+mn-lt"/>
-              </a:rPr>
-              <a:t> </a:t>
-            </a:r>
-            <a:r>
-              <a:rPr lang="et-EE" sz="4000" err="1" smtClean="0">
+              <a:rPr lang="et-EE" sz="4000" dirty="0" smtClean="0">
+                <a:latin typeface="+mn-lt"/>
+              </a:rPr>
+              <a:t> </a:t>
+            </a:r>
+            <a:r>
+              <a:rPr lang="et-EE" sz="4000" dirty="0" err="1" smtClean="0">
                 <a:latin typeface="+mn-lt"/>
               </a:rPr>
               <a:t>with</a:t>
             </a:r>
             <a:r>
-              <a:rPr lang="et-EE" sz="4000" smtClean="0">
-                <a:latin typeface="+mn-lt"/>
-              </a:rPr>
-              <a:t> </a:t>
-            </a:r>
-            <a:r>
-              <a:rPr lang="et-EE" sz="4000" err="1" smtClean="0">
+              <a:rPr lang="et-EE" sz="4000" dirty="0" smtClean="0">
+                <a:latin typeface="+mn-lt"/>
+              </a:rPr>
+              <a:t> </a:t>
+            </a:r>
+            <a:r>
+              <a:rPr lang="et-EE" sz="4000" dirty="0" err="1" smtClean="0">
                 <a:latin typeface="+mn-lt"/>
               </a:rPr>
               <a:t>popularity</a:t>
             </a:r>
             <a:r>
-              <a:rPr lang="et-EE" sz="4000" smtClean="0">
-                <a:latin typeface="+mn-lt"/>
-              </a:rPr>
-              <a:t> </a:t>
-            </a:r>
-            <a:r>
-              <a:rPr lang="et-EE" sz="4000" err="1" smtClean="0">
+              <a:rPr lang="et-EE" sz="4000" dirty="0" smtClean="0">
+                <a:latin typeface="+mn-lt"/>
+              </a:rPr>
+              <a:t> </a:t>
+            </a:r>
+            <a:r>
+              <a:rPr lang="et-EE" sz="4000" dirty="0" err="1" smtClean="0">
                 <a:latin typeface="+mn-lt"/>
               </a:rPr>
               <a:t>under</a:t>
             </a:r>
             <a:r>
-              <a:rPr lang="et-EE" sz="4000" smtClean="0">
+              <a:rPr lang="et-EE" sz="4000" dirty="0" smtClean="0">
                 <a:latin typeface="+mn-lt"/>
               </a:rPr>
               <a:t> 40 </a:t>
             </a:r>
             <a:r>
-              <a:rPr lang="et-EE" sz="4000" err="1" smtClean="0">
+              <a:rPr lang="et-EE" sz="4000" dirty="0" err="1" smtClean="0">
                 <a:latin typeface="+mn-lt"/>
               </a:rPr>
               <a:t>for</a:t>
             </a:r>
             <a:r>
-              <a:rPr lang="et-EE" sz="4000" smtClean="0">
+              <a:rPr lang="et-EE" sz="4000" dirty="0" smtClean="0">
                 <a:latin typeface="+mn-lt"/>
               </a:rPr>
               <a:t> non-</a:t>
             </a:r>
             <a:r>
-              <a:rPr lang="et-EE" sz="4000" err="1" smtClean="0">
+              <a:rPr lang="et-EE" sz="4000" dirty="0" err="1" smtClean="0">
                 <a:latin typeface="+mn-lt"/>
               </a:rPr>
               <a:t>popular</a:t>
             </a:r>
             <a:r>
-              <a:rPr lang="et-EE" sz="4000" smtClean="0">
-                <a:latin typeface="+mn-lt"/>
-              </a:rPr>
-              <a:t> </a:t>
-            </a:r>
-            <a:r>
-              <a:rPr lang="et-EE" sz="4000" err="1" smtClean="0">
+              <a:rPr lang="et-EE" sz="4000" dirty="0" smtClean="0">
+                <a:latin typeface="+mn-lt"/>
+              </a:rPr>
+              <a:t> </a:t>
+            </a:r>
+            <a:r>
+              <a:rPr lang="et-EE" sz="4000" dirty="0" err="1" smtClean="0">
                 <a:latin typeface="+mn-lt"/>
               </a:rPr>
               <a:t>songs</a:t>
             </a:r>
             <a:r>
-              <a:rPr lang="et-EE" sz="4000" smtClean="0">
-                <a:latin typeface="+mn-lt"/>
-              </a:rPr>
-              <a:t> </a:t>
-            </a:r>
-            <a:r>
-              <a:rPr lang="et-EE" sz="4000" err="1" smtClean="0">
+              <a:rPr lang="et-EE" sz="4000" dirty="0" smtClean="0">
+                <a:latin typeface="+mn-lt"/>
+              </a:rPr>
+              <a:t> </a:t>
+            </a:r>
+            <a:r>
+              <a:rPr lang="et-EE" sz="4000" dirty="0" err="1" smtClean="0">
                 <a:latin typeface="+mn-lt"/>
               </a:rPr>
               <a:t>for</a:t>
             </a:r>
             <a:r>
-              <a:rPr lang="et-EE" sz="4000" smtClean="0">
-                <a:latin typeface="+mn-lt"/>
-              </a:rPr>
-              <a:t> </a:t>
-            </a:r>
-            <a:r>
-              <a:rPr lang="et-EE" sz="4000" err="1" smtClean="0">
+              <a:rPr lang="et-EE" sz="4000" dirty="0" smtClean="0">
+                <a:latin typeface="+mn-lt"/>
+              </a:rPr>
+              <a:t> </a:t>
+            </a:r>
+            <a:r>
+              <a:rPr lang="et-EE" sz="4000" dirty="0" err="1" smtClean="0">
                 <a:latin typeface="+mn-lt"/>
               </a:rPr>
               <a:t>training</a:t>
             </a:r>
             <a:r>
-              <a:rPr lang="et-EE" sz="4000" smtClean="0">
+              <a:rPr lang="et-EE" sz="4000" dirty="0" smtClean="0">
                 <a:latin typeface="+mn-lt"/>
               </a:rPr>
               <a:t>, so </a:t>
             </a:r>
             <a:r>
-              <a:rPr lang="et-EE" sz="4000" err="1" smtClean="0">
+              <a:rPr lang="et-EE" sz="4000" dirty="0" err="1" smtClean="0">
                 <a:latin typeface="+mn-lt"/>
               </a:rPr>
               <a:t>we</a:t>
             </a:r>
             <a:r>
-              <a:rPr lang="et-EE" sz="4000" smtClean="0">
-                <a:latin typeface="+mn-lt"/>
-              </a:rPr>
-              <a:t> </a:t>
-            </a:r>
-            <a:r>
-              <a:rPr lang="et-EE" sz="4000" err="1" smtClean="0">
+              <a:rPr lang="et-EE" sz="4000" dirty="0" smtClean="0">
+                <a:latin typeface="+mn-lt"/>
+              </a:rPr>
+              <a:t> </a:t>
+            </a:r>
+            <a:r>
+              <a:rPr lang="et-EE" sz="4000" dirty="0" err="1" smtClean="0">
                 <a:latin typeface="+mn-lt"/>
               </a:rPr>
               <a:t>discarded</a:t>
             </a:r>
             <a:r>
-              <a:rPr lang="et-EE" sz="4000" smtClean="0">
-                <a:latin typeface="+mn-lt"/>
-              </a:rPr>
-              <a:t> </a:t>
-            </a:r>
-            <a:r>
-              <a:rPr lang="et-EE" sz="4000" err="1" smtClean="0">
+              <a:rPr lang="et-EE" sz="4000" dirty="0" smtClean="0">
+                <a:latin typeface="+mn-lt"/>
+              </a:rPr>
+              <a:t> </a:t>
+            </a:r>
+            <a:r>
+              <a:rPr lang="et-EE" sz="4000" dirty="0" err="1" smtClean="0">
                 <a:latin typeface="+mn-lt"/>
               </a:rPr>
               <a:t>those</a:t>
             </a:r>
             <a:r>
-              <a:rPr lang="et-EE" sz="4000" smtClean="0">
-                <a:latin typeface="+mn-lt"/>
-              </a:rPr>
-              <a:t> </a:t>
-            </a:r>
-            <a:r>
-              <a:rPr lang="et-EE" sz="4000" err="1" smtClean="0">
+              <a:rPr lang="et-EE" sz="4000" dirty="0" smtClean="0">
+                <a:latin typeface="+mn-lt"/>
+              </a:rPr>
+              <a:t> </a:t>
+            </a:r>
+            <a:r>
+              <a:rPr lang="et-EE" sz="4000" dirty="0" err="1" smtClean="0">
                 <a:latin typeface="+mn-lt"/>
               </a:rPr>
               <a:t>that</a:t>
             </a:r>
             <a:r>
-              <a:rPr lang="et-EE" sz="4000" smtClean="0">
-                <a:latin typeface="+mn-lt"/>
-              </a:rPr>
-              <a:t> </a:t>
-            </a:r>
-            <a:r>
-              <a:rPr lang="et-EE" sz="4000" err="1" smtClean="0">
+              <a:rPr lang="et-EE" sz="4000" dirty="0" smtClean="0">
+                <a:latin typeface="+mn-lt"/>
+              </a:rPr>
+              <a:t> </a:t>
+            </a:r>
+            <a:r>
+              <a:rPr lang="et-EE" sz="4000" dirty="0" err="1" smtClean="0">
                 <a:latin typeface="+mn-lt"/>
               </a:rPr>
               <a:t>were</a:t>
             </a:r>
             <a:r>
-              <a:rPr lang="et-EE" sz="4000" smtClean="0">
-                <a:latin typeface="+mn-lt"/>
-              </a:rPr>
-              <a:t> </a:t>
-            </a:r>
-            <a:r>
-              <a:rPr lang="et-EE" sz="4000" err="1" smtClean="0">
+              <a:rPr lang="et-EE" sz="4000" dirty="0" smtClean="0">
+                <a:latin typeface="+mn-lt"/>
+              </a:rPr>
+              <a:t> </a:t>
+            </a:r>
+            <a:r>
+              <a:rPr lang="et-EE" sz="4000" dirty="0" err="1" smtClean="0">
                 <a:latin typeface="+mn-lt"/>
               </a:rPr>
               <a:t>inbetween</a:t>
             </a:r>
             <a:r>
-              <a:rPr lang="et-EE" sz="4000" smtClean="0">
+              <a:rPr lang="et-EE" sz="4000" dirty="0" smtClean="0">
                 <a:latin typeface="+mn-lt"/>
               </a:rPr>
               <a:t>.</a:t>
             </a:r>
-            <a:endParaRPr lang="et-EE" sz="4000">
+            <a:endParaRPr lang="et-EE" sz="4000" dirty="0">
               <a:latin typeface="+mn-lt"/>
             </a:endParaRPr>
           </a:p>
@@ -6529,7 +6523,7 @@
               <a:rPr lang="et-EE" sz="4000" dirty="0" smtClean="0">
                 <a:latin typeface="+mn-lt"/>
               </a:rPr>
-              <a:t>, </a:t>
+              <a:t> </a:t>
             </a:r>
             <a:r>
               <a:rPr lang="et-EE" sz="4000" dirty="0" err="1" smtClean="0">
@@ -7377,11 +7371,7 @@
             </a:r>
             <a:r>
               <a:rPr lang="et-EE" sz="2600" dirty="0" smtClean="0"/>
-              <a:t> 2017 </a:t>
-            </a:r>
-            <a:r>
-              <a:rPr lang="et-EE" sz="2600" dirty="0" smtClean="0"/>
-              <a:t>and 2018</a:t>
+              <a:t> 2017 and 2018</a:t>
             </a:r>
             <a:endParaRPr lang="et-EE" sz="2600" dirty="0"/>
           </a:p>

</xml_diff>